<commit_message>
more samples na zvika
</commit_message>
<xml_diff>
--- a/02-cvicenie/02-cvicenie.pptx
+++ b/02-cvicenie/02-cvicenie.pptx
@@ -107,6 +107,11 @@
       </a:defRPr>
     </a:lvl9pPr>
   </p:defaultTextStyle>
+  <p:extLst>
+    <p:ext uri="{EFAFB233-063F-42B5-8137-9DF3F51BA10A}">
+      <p15:sldGuideLst xmlns:p15="http://schemas.microsoft.com/office/powerpoint/2012/main"/>
+    </p:ext>
+  </p:extLst>
 </p:presentation>
 </file>
 
@@ -3372,11 +3377,7 @@
             </a:r>
             <a:r>
               <a:rPr lang="en-US" dirty="0" smtClean="0"/>
-              <a:t> 01 - </a:t>
-            </a:r>
-            <a:r>
-              <a:rPr lang="en-US" dirty="0" smtClean="0"/>
-              <a:t>Exploratory testing </a:t>
+              <a:t> 01 - Exploratory testing </a:t>
             </a:r>
             <a:endParaRPr lang="sk-SK" dirty="0"/>
           </a:p>
@@ -3403,22 +3404,43 @@
               <a:buNone/>
             </a:pPr>
             <a:r>
+              <a:rPr lang="en-US" b="1" dirty="0" smtClean="0"/>
+              <a:t>Setup </a:t>
+            </a:r>
+            <a:r>
+              <a:rPr lang="en-US" b="1" dirty="0" err="1" smtClean="0"/>
+              <a:t>projektu</a:t>
+            </a:r>
+            <a:r>
+              <a:rPr lang="en-US" b="1" dirty="0" smtClean="0"/>
+              <a:t>:</a:t>
+            </a:r>
+          </a:p>
+          <a:p>
+            <a:pPr marL="0" indent="0">
+              <a:buNone/>
+            </a:pPr>
+            <a:r>
+              <a:rPr lang="en-US" dirty="0" err="1" smtClean="0"/>
+              <a:t>git</a:t>
+            </a:r>
+            <a:r>
               <a:rPr lang="en-US" dirty="0" smtClean="0"/>
-              <a:t>Setup </a:t>
-            </a:r>
+              <a:t> checkout master</a:t>
+            </a:r>
+          </a:p>
+          <a:p>
+            <a:pPr marL="0" indent="0">
+              <a:buNone/>
+            </a:pPr>
             <a:r>
               <a:rPr lang="en-US" dirty="0" err="1" smtClean="0"/>
-              <a:t>projektu</a:t>
+              <a:t>git</a:t>
             </a:r>
             <a:r>
               <a:rPr lang="en-US" dirty="0" smtClean="0"/>
-              <a:t>:</a:t>
-            </a:r>
-          </a:p>
-          <a:p>
-            <a:pPr marL="0" indent="0">
-              <a:buNone/>
-            </a:pPr>
+              <a:t> pull</a:t>
+            </a:r>
             <a:endParaRPr lang="en-US" dirty="0" smtClean="0"/>
           </a:p>
           <a:p>
@@ -3662,32 +3684,9 @@
           <a:chExt cx="0" cy="0"/>
         </a:xfrm>
       </p:grpSpPr>
-      <p:sp>
-        <p:nvSpPr>
-          <p:cNvPr id="2" name="Title 1"/>
-          <p:cNvSpPr>
-            <a:spLocks noGrp="1"/>
-          </p:cNvSpPr>
-          <p:nvPr>
-            <p:ph type="title"/>
-          </p:nvPr>
-        </p:nvSpPr>
-        <p:spPr/>
-        <p:txBody>
-          <a:bodyPr/>
-          <a:lstStyle/>
-          <a:p>
-            <a:r>
-              <a:rPr lang="en-US" dirty="0" smtClean="0"/>
-              <a:t>mocha basics</a:t>
-            </a:r>
-            <a:endParaRPr lang="sk-SK" dirty="0"/>
-          </a:p>
-        </p:txBody>
-      </p:sp>
       <p:pic>
         <p:nvPicPr>
-          <p:cNvPr id="6" name="Picture 5"/>
+          <p:cNvPr id="8" name="Picture 7"/>
           <p:cNvPicPr>
             <a:picLocks noChangeAspect="1"/>
           </p:cNvPicPr>
@@ -3701,14 +3700,37 @@
         </p:blipFill>
         <p:spPr>
           <a:xfrm>
-            <a:off x="838200" y="1374733"/>
-            <a:ext cx="9677400" cy="5070452"/>
+            <a:off x="838200" y="1419496"/>
+            <a:ext cx="9766300" cy="5270229"/>
           </a:xfrm>
           <a:prstGeom prst="rect">
             <a:avLst/>
           </a:prstGeom>
         </p:spPr>
       </p:pic>
+      <p:sp>
+        <p:nvSpPr>
+          <p:cNvPr id="2" name="Title 1"/>
+          <p:cNvSpPr>
+            <a:spLocks noGrp="1"/>
+          </p:cNvSpPr>
+          <p:nvPr>
+            <p:ph type="title"/>
+          </p:nvPr>
+        </p:nvSpPr>
+        <p:spPr/>
+        <p:txBody>
+          <a:bodyPr/>
+          <a:lstStyle/>
+          <a:p>
+            <a:r>
+              <a:rPr lang="en-US" dirty="0" smtClean="0"/>
+              <a:t>mocha basics</a:t>
+            </a:r>
+            <a:endParaRPr lang="sk-SK" dirty="0"/>
+          </a:p>
+        </p:txBody>
+      </p:sp>
       <p:pic>
         <p:nvPicPr>
           <p:cNvPr id="7" name="Picture 6"/>
@@ -3725,7 +3747,7 @@
         </p:blipFill>
         <p:spPr>
           <a:xfrm>
-            <a:off x="6477000" y="4730363"/>
+            <a:off x="6248400" y="171063"/>
             <a:ext cx="5513387" cy="1959362"/>
           </a:xfrm>
           <a:prstGeom prst="rect">

</xml_diff>